<commit_message>
skel and idotea plots
</commit_message>
<xml_diff>
--- a/figures/Cline summary.pptx
+++ b/figures/Cline summary.pptx
@@ -7,6 +7,7 @@
   <p:sldIdLst>
     <p:sldId id="256" r:id="rId2"/>
     <p:sldId id="257" r:id="rId3"/>
+    <p:sldId id="258" r:id="rId4"/>
   </p:sldIdLst>
   <p:sldSz cx="12192000" cy="6858000"/>
   <p:notesSz cx="6858000" cy="9144000"/>
@@ -3673,6 +3674,108 @@
 </p:sld>
 </file>
 
+<file path=ppt/slides/slide3.xml><?xml version="1.0" encoding="utf-8"?>
+<p:sld xmlns:a="http://schemas.openxmlformats.org/drawingml/2006/main" xmlns:r="http://schemas.openxmlformats.org/officeDocument/2006/relationships" xmlns:p="http://schemas.openxmlformats.org/presentationml/2006/main">
+  <p:cSld>
+    <p:spTree>
+      <p:nvGrpSpPr>
+        <p:cNvPr id="1" name=""/>
+        <p:cNvGrpSpPr/>
+        <p:nvPr/>
+      </p:nvGrpSpPr>
+      <p:grpSpPr>
+        <a:xfrm>
+          <a:off x="0" y="0"/>
+          <a:ext cx="0" cy="0"/>
+          <a:chOff x="0" y="0"/>
+          <a:chExt cx="0" cy="0"/>
+        </a:xfrm>
+      </p:grpSpPr>
+      <p:pic>
+        <p:nvPicPr>
+          <p:cNvPr id="3" name="Graphic 2">
+            <a:extLst>
+              <a:ext uri="{FF2B5EF4-FFF2-40B4-BE49-F238E27FC236}">
+                <a16:creationId xmlns:a16="http://schemas.microsoft.com/office/drawing/2014/main" id="{524B9F07-D448-8044-A6DC-E8A90CE1AAEA}"/>
+              </a:ext>
+            </a:extLst>
+          </p:cNvPr>
+          <p:cNvPicPr>
+            <a:picLocks noChangeAspect="1"/>
+          </p:cNvPicPr>
+          <p:nvPr/>
+        </p:nvPicPr>
+        <p:blipFill>
+          <a:blip r:embed="rId2">
+            <a:extLst>
+              <a:ext uri="{96DAC541-7B7A-43D3-8B79-37D633B846F1}">
+                <asvg:svgBlip xmlns:asvg="http://schemas.microsoft.com/office/drawing/2016/SVG/main" r:embed="rId3"/>
+              </a:ext>
+            </a:extLst>
+          </a:blip>
+          <a:stretch>
+            <a:fillRect/>
+          </a:stretch>
+        </p:blipFill>
+        <p:spPr>
+          <a:xfrm>
+            <a:off x="154940" y="2773679"/>
+            <a:ext cx="6126482" cy="4084321"/>
+          </a:xfrm>
+          <a:prstGeom prst="rect">
+            <a:avLst/>
+          </a:prstGeom>
+        </p:spPr>
+      </p:pic>
+      <p:pic>
+        <p:nvPicPr>
+          <p:cNvPr id="5" name="Graphic 4">
+            <a:extLst>
+              <a:ext uri="{FF2B5EF4-FFF2-40B4-BE49-F238E27FC236}">
+                <a16:creationId xmlns:a16="http://schemas.microsoft.com/office/drawing/2014/main" id="{A1C5517A-F52E-4C44-8022-327DECCDFA54}"/>
+              </a:ext>
+            </a:extLst>
+          </p:cNvPr>
+          <p:cNvPicPr>
+            <a:picLocks noChangeAspect="1"/>
+          </p:cNvPicPr>
+          <p:nvPr/>
+        </p:nvPicPr>
+        <p:blipFill>
+          <a:blip r:embed="rId4">
+            <a:extLst>
+              <a:ext uri="{96DAC541-7B7A-43D3-8B79-37D633B846F1}">
+                <asvg:svgBlip xmlns:asvg="http://schemas.microsoft.com/office/drawing/2016/SVG/main" r:embed="rId5"/>
+              </a:ext>
+            </a:extLst>
+          </a:blip>
+          <a:stretch>
+            <a:fillRect/>
+          </a:stretch>
+        </p:blipFill>
+        <p:spPr>
+          <a:xfrm>
+            <a:off x="5902960" y="0"/>
+            <a:ext cx="6096000" cy="4064000"/>
+          </a:xfrm>
+          <a:prstGeom prst="rect">
+            <a:avLst/>
+          </a:prstGeom>
+        </p:spPr>
+      </p:pic>
+    </p:spTree>
+    <p:extLst>
+      <p:ext uri="{BB962C8B-B14F-4D97-AF65-F5344CB8AC3E}">
+        <p14:creationId xmlns:p14="http://schemas.microsoft.com/office/powerpoint/2010/main" val="3650099431"/>
+      </p:ext>
+    </p:extLst>
+  </p:cSld>
+  <p:clrMapOvr>
+    <a:masterClrMapping/>
+  </p:clrMapOvr>
+</p:sld>
+</file>
+
 <file path=ppt/theme/theme1.xml><?xml version="1.0" encoding="utf-8"?>
 <a:theme xmlns:a="http://schemas.openxmlformats.org/drawingml/2006/main" name="Office Theme">
   <a:themeElements>

</xml_diff>